<commit_message>
Agile ppt document updated
</commit_message>
<xml_diff>
--- a/agile/class-notes/Scrum-Karban.pptx
+++ b/agile/class-notes/Scrum-Karban.pptx
@@ -109,6 +109,11 @@
       </a:defRPr>
     </a:lvl9pPr>
   </p:defaultTextStyle>
+  <p:extLst>
+    <p:ext uri="{EFAFB233-063F-42B5-8137-9DF3F51BA10A}">
+      <p15:sldGuideLst xmlns:p15="http://schemas.microsoft.com/office/powerpoint/2012/main"/>
+    </p:ext>
+  </p:extLst>
 </p:presentation>
 </file>
 
@@ -259,7 +264,7 @@
           <a:p>
             <a:fld id="{5198F3F3-EDE9-4946-A59E-1364AA9A8779}" type="datetimeFigureOut">
               <a:rPr lang="tr-TR" smtClean="0"/>
-              <a:t>15.08.2021</a:t>
+              <a:t>5.09.2021</a:t>
             </a:fld>
             <a:endParaRPr lang="tr-TR"/>
           </a:p>
@@ -457,7 +462,7 @@
           <a:p>
             <a:fld id="{5198F3F3-EDE9-4946-A59E-1364AA9A8779}" type="datetimeFigureOut">
               <a:rPr lang="tr-TR" smtClean="0"/>
-              <a:t>15.08.2021</a:t>
+              <a:t>5.09.2021</a:t>
             </a:fld>
             <a:endParaRPr lang="tr-TR"/>
           </a:p>
@@ -665,7 +670,7 @@
           <a:p>
             <a:fld id="{5198F3F3-EDE9-4946-A59E-1364AA9A8779}" type="datetimeFigureOut">
               <a:rPr lang="tr-TR" smtClean="0"/>
-              <a:t>15.08.2021</a:t>
+              <a:t>5.09.2021</a:t>
             </a:fld>
             <a:endParaRPr lang="tr-TR"/>
           </a:p>
@@ -863,7 +868,7 @@
           <a:p>
             <a:fld id="{5198F3F3-EDE9-4946-A59E-1364AA9A8779}" type="datetimeFigureOut">
               <a:rPr lang="tr-TR" smtClean="0"/>
-              <a:t>15.08.2021</a:t>
+              <a:t>5.09.2021</a:t>
             </a:fld>
             <a:endParaRPr lang="tr-TR"/>
           </a:p>
@@ -1138,7 +1143,7 @@
           <a:p>
             <a:fld id="{5198F3F3-EDE9-4946-A59E-1364AA9A8779}" type="datetimeFigureOut">
               <a:rPr lang="tr-TR" smtClean="0"/>
-              <a:t>15.08.2021</a:t>
+              <a:t>5.09.2021</a:t>
             </a:fld>
             <a:endParaRPr lang="tr-TR"/>
           </a:p>
@@ -1403,7 +1408,7 @@
           <a:p>
             <a:fld id="{5198F3F3-EDE9-4946-A59E-1364AA9A8779}" type="datetimeFigureOut">
               <a:rPr lang="tr-TR" smtClean="0"/>
-              <a:t>15.08.2021</a:t>
+              <a:t>5.09.2021</a:t>
             </a:fld>
             <a:endParaRPr lang="tr-TR"/>
           </a:p>
@@ -1815,7 +1820,7 @@
           <a:p>
             <a:fld id="{5198F3F3-EDE9-4946-A59E-1364AA9A8779}" type="datetimeFigureOut">
               <a:rPr lang="tr-TR" smtClean="0"/>
-              <a:t>15.08.2021</a:t>
+              <a:t>5.09.2021</a:t>
             </a:fld>
             <a:endParaRPr lang="tr-TR"/>
           </a:p>
@@ -1956,7 +1961,7 @@
           <a:p>
             <a:fld id="{5198F3F3-EDE9-4946-A59E-1364AA9A8779}" type="datetimeFigureOut">
               <a:rPr lang="tr-TR" smtClean="0"/>
-              <a:t>15.08.2021</a:t>
+              <a:t>5.09.2021</a:t>
             </a:fld>
             <a:endParaRPr lang="tr-TR"/>
           </a:p>
@@ -2069,7 +2074,7 @@
           <a:p>
             <a:fld id="{5198F3F3-EDE9-4946-A59E-1364AA9A8779}" type="datetimeFigureOut">
               <a:rPr lang="tr-TR" smtClean="0"/>
-              <a:t>15.08.2021</a:t>
+              <a:t>5.09.2021</a:t>
             </a:fld>
             <a:endParaRPr lang="tr-TR"/>
           </a:p>
@@ -2380,7 +2385,7 @@
           <a:p>
             <a:fld id="{5198F3F3-EDE9-4946-A59E-1364AA9A8779}" type="datetimeFigureOut">
               <a:rPr lang="tr-TR" smtClean="0"/>
-              <a:t>15.08.2021</a:t>
+              <a:t>5.09.2021</a:t>
             </a:fld>
             <a:endParaRPr lang="tr-TR"/>
           </a:p>
@@ -2668,7 +2673,7 @@
           <a:p>
             <a:fld id="{5198F3F3-EDE9-4946-A59E-1364AA9A8779}" type="datetimeFigureOut">
               <a:rPr lang="tr-TR" smtClean="0"/>
-              <a:t>15.08.2021</a:t>
+              <a:t>5.09.2021</a:t>
             </a:fld>
             <a:endParaRPr lang="tr-TR"/>
           </a:p>
@@ -2909,7 +2914,7 @@
           <a:p>
             <a:fld id="{5198F3F3-EDE9-4946-A59E-1364AA9A8779}" type="datetimeFigureOut">
               <a:rPr lang="tr-TR" smtClean="0"/>
-              <a:t>15.08.2021</a:t>
+              <a:t>5.09.2021</a:t>
             </a:fld>
             <a:endParaRPr lang="tr-TR"/>
           </a:p>
@@ -5898,13 +5903,10 @@
             </a:endParaRPr>
           </a:p>
           <a:p>
-            <a:r>
-              <a:rPr lang="tr-TR" sz="1200" dirty="0">
-                <a:latin typeface="Arial" panose="020B0604020202020204" pitchFamily="34" charset="0"/>
-                <a:cs typeface="Arial" panose="020B0604020202020204" pitchFamily="34" charset="0"/>
-              </a:rPr>
-              <a:t>1940-Toyota</a:t>
-            </a:r>
+            <a:endParaRPr lang="tr-TR" sz="1200" dirty="0">
+              <a:latin typeface="Arial" panose="020B0604020202020204" pitchFamily="34" charset="0"/>
+              <a:cs typeface="Arial" panose="020B0604020202020204" pitchFamily="34" charset="0"/>
+            </a:endParaRPr>
           </a:p>
         </p:txBody>
       </p:sp>

</xml_diff>